<commit_message>
240516 otel 내용 정리
</commit_message>
<xml_diff>
--- a/[Otel]정리.pptx
+++ b/[Otel]정리.pptx
@@ -544,7 +544,7 @@
           <a:p>
             <a:fld id="{1F49943E-C2BA-4C4E-99F9-9166BE327F3B}" type="slidenum">
               <a:rPr kumimoji="1" lang="ko-KR" altLang="en-US" smtClean="0"/>
-              <a:t>2</a:t>
+              <a:t>1</a:t>
             </a:fld>
             <a:endParaRPr kumimoji="1" lang="ko-KR" altLang="en-US"/>
           </a:p>
@@ -553,7 +553,7 @@
     </p:spTree>
     <p:extLst>
       <p:ext uri="{BB962C8B-B14F-4D97-AF65-F5344CB8AC3E}">
-        <p14:creationId xmlns:p14="http://schemas.microsoft.com/office/powerpoint/2010/main" val="2180915903"/>
+        <p14:creationId xmlns:p14="http://schemas.microsoft.com/office/powerpoint/2010/main" val="3393637107"/>
       </p:ext>
     </p:extLst>
   </p:cSld>
@@ -628,6 +628,90 @@
           <a:p>
             <a:fld id="{1F49943E-C2BA-4C4E-99F9-9166BE327F3B}" type="slidenum">
               <a:rPr kumimoji="1" lang="ko-KR" altLang="en-US" smtClean="0"/>
+              <a:t>2</a:t>
+            </a:fld>
+            <a:endParaRPr kumimoji="1" lang="ko-KR" altLang="en-US"/>
+          </a:p>
+        </p:txBody>
+      </p:sp>
+    </p:spTree>
+    <p:extLst>
+      <p:ext uri="{BB962C8B-B14F-4D97-AF65-F5344CB8AC3E}">
+        <p14:creationId xmlns:p14="http://schemas.microsoft.com/office/powerpoint/2010/main" val="2180915903"/>
+      </p:ext>
+    </p:extLst>
+  </p:cSld>
+  <p:clrMapOvr>
+    <a:masterClrMapping/>
+  </p:clrMapOvr>
+</p:notes>
+</file>
+
+<file path=ppt/notesSlides/notesSlide3.xml><?xml version="1.0" encoding="utf-8"?>
+<p:notes xmlns:a="http://schemas.openxmlformats.org/drawingml/2006/main" xmlns:r="http://schemas.openxmlformats.org/officeDocument/2006/relationships" xmlns:p="http://schemas.openxmlformats.org/presentationml/2006/main">
+  <p:cSld>
+    <p:spTree>
+      <p:nvGrpSpPr>
+        <p:cNvPr id="1" name=""/>
+        <p:cNvGrpSpPr/>
+        <p:nvPr/>
+      </p:nvGrpSpPr>
+      <p:grpSpPr>
+        <a:xfrm>
+          <a:off x="0" y="0"/>
+          <a:ext cx="0" cy="0"/>
+          <a:chOff x="0" y="0"/>
+          <a:chExt cx="0" cy="0"/>
+        </a:xfrm>
+      </p:grpSpPr>
+      <p:sp>
+        <p:nvSpPr>
+          <p:cNvPr id="2" name="슬라이드 이미지 개체 틀 1"/>
+          <p:cNvSpPr>
+            <a:spLocks noGrp="1" noRot="1" noChangeAspect="1"/>
+          </p:cNvSpPr>
+          <p:nvPr>
+            <p:ph type="sldImg"/>
+          </p:nvPr>
+        </p:nvSpPr>
+        <p:spPr/>
+      </p:sp>
+      <p:sp>
+        <p:nvSpPr>
+          <p:cNvPr id="3" name="슬라이드 노트 개체 틀 2"/>
+          <p:cNvSpPr>
+            <a:spLocks noGrp="1"/>
+          </p:cNvSpPr>
+          <p:nvPr>
+            <p:ph type="body" idx="1"/>
+          </p:nvPr>
+        </p:nvSpPr>
+        <p:spPr/>
+        <p:txBody>
+          <a:bodyPr/>
+          <a:lstStyle/>
+          <a:p>
+            <a:endParaRPr kumimoji="1" lang="ko-KR" altLang="en-US" dirty="0"/>
+          </a:p>
+        </p:txBody>
+      </p:sp>
+      <p:sp>
+        <p:nvSpPr>
+          <p:cNvPr id="4" name="슬라이드 번호 개체 틀 3"/>
+          <p:cNvSpPr>
+            <a:spLocks noGrp="1"/>
+          </p:cNvSpPr>
+          <p:nvPr>
+            <p:ph type="sldNum" sz="quarter" idx="5"/>
+          </p:nvPr>
+        </p:nvSpPr>
+        <p:spPr/>
+        <p:txBody>
+          <a:bodyPr/>
+          <a:lstStyle/>
+          <a:p>
+            <a:fld id="{1F49943E-C2BA-4C4E-99F9-9166BE327F3B}" type="slidenum">
+              <a:rPr kumimoji="1" lang="ko-KR" altLang="en-US" smtClean="0"/>
               <a:t>4</a:t>
             </a:fld>
             <a:endParaRPr kumimoji="1" lang="ko-KR" altLang="en-US"/>
@@ -647,7 +731,7 @@
 </p:notes>
 </file>
 
-<file path=ppt/notesSlides/notesSlide3.xml><?xml version="1.0" encoding="utf-8"?>
+<file path=ppt/notesSlides/notesSlide4.xml><?xml version="1.0" encoding="utf-8"?>
 <p:notes xmlns:a="http://schemas.openxmlformats.org/drawingml/2006/main" xmlns:r="http://schemas.openxmlformats.org/officeDocument/2006/relationships" xmlns:p="http://schemas.openxmlformats.org/presentationml/2006/main">
   <p:cSld>
     <p:spTree>
@@ -4033,7 +4117,7 @@
             </a:pPr>
             <a:r>
               <a:rPr kumimoji="1" lang="en-US" altLang="ko-KR" sz="1800" dirty="0"/>
-              <a:t>05.08~05.17</a:t>
+              <a:t>05.08~05.24</a:t>
             </a:r>
           </a:p>
           <a:p>
@@ -4098,7 +4182,7 @@
             </a:pPr>
             <a:r>
               <a:rPr kumimoji="1" lang="en-US" altLang="ko-KR" sz="1800" dirty="0"/>
-              <a:t>05.20~06.14</a:t>
+              <a:t>05.27~06.21</a:t>
             </a:r>
           </a:p>
           <a:p>
@@ -4128,6 +4212,21 @@
             <a:endParaRPr kumimoji="1" lang="en-US" altLang="ko-KR" sz="1800" dirty="0"/>
           </a:p>
           <a:p>
+            <a:pPr>
+              <a:buFontTx/>
+              <a:buChar char="-"/>
+            </a:pPr>
+            <a:r>
+              <a:rPr kumimoji="1" lang="en-US" altLang="ko-KR" sz="1800" dirty="0"/>
+              <a:t>AIOps &amp; K8s </a:t>
+            </a:r>
+            <a:r>
+              <a:rPr kumimoji="1" lang="ko-KR" altLang="en-US" sz="1800" dirty="0"/>
+              <a:t>도입 방법 조사</a:t>
+            </a:r>
+            <a:endParaRPr kumimoji="1" lang="en-US" altLang="ko-KR" sz="1800" dirty="0"/>
+          </a:p>
+          <a:p>
             <a:pPr marL="0" indent="0">
               <a:buNone/>
             </a:pPr>
@@ -4139,23 +4238,8 @@
             </a:pPr>
             <a:r>
               <a:rPr kumimoji="1" lang="en-US" altLang="ko-KR" sz="1800" dirty="0"/>
-              <a:t>06.17~07.12</a:t>
-            </a:r>
-          </a:p>
-          <a:p>
-            <a:pPr>
-              <a:buFontTx/>
-              <a:buChar char="-"/>
-            </a:pPr>
-            <a:r>
-              <a:rPr kumimoji="1" lang="en-US" altLang="ko-KR" sz="1800" dirty="0"/>
-              <a:t>AIOps &amp; K8s </a:t>
-            </a:r>
-            <a:r>
-              <a:rPr kumimoji="1" lang="ko-KR" altLang="en-US" sz="1800" dirty="0"/>
-              <a:t>도입 방법 조사</a:t>
-            </a:r>
-            <a:endParaRPr kumimoji="1" lang="en-US" altLang="ko-KR" sz="1800" dirty="0"/>
+              <a:t>06.24~07.26</a:t>
+            </a:r>
           </a:p>
           <a:p>
             <a:pPr>
@@ -5628,7 +5712,7 @@
                 <a:effectLst/>
                 <a:latin typeface="Helvetica Neue" panose="02000503000000020004" pitchFamily="2" charset="0"/>
               </a:rPr>
-              <a:t>20</a:t>
+              <a:t>27</a:t>
             </a:r>
             <a:r>
               <a:rPr lang="ko-KR" altLang="en-US" sz="3200" dirty="0">
@@ -5668,7 +5752,7 @@
                 <a:effectLst/>
                 <a:latin typeface="Helvetica Neue" panose="02000503000000020004" pitchFamily="2" charset="0"/>
               </a:rPr>
-              <a:t>14</a:t>
+              <a:t>21</a:t>
             </a:r>
             <a:r>
               <a:rPr lang="ko-KR" altLang="en-US" sz="3200" dirty="0">
@@ -6170,10 +6254,9 @@
                 <a:solidFill>
                   <a:srgbClr val="000000"/>
                 </a:solidFill>
-                <a:effectLst/>
                 <a:latin typeface="Helvetica Neue" panose="02000503000000020004" pitchFamily="2" charset="0"/>
               </a:rPr>
-              <a:t>17</a:t>
+              <a:t>24</a:t>
             </a:r>
             <a:r>
               <a:rPr lang="ko-KR" altLang="en-US" sz="3200" dirty="0">
@@ -6718,36 +6801,6 @@
           </a:p>
         </p:txBody>
       </p:sp>
-      <p:pic>
-        <p:nvPicPr>
-          <p:cNvPr id="7" name="그림 6" descr="텍스트, 스크린샷, 소프트웨어, 컴퓨터 아이콘이(가) 표시된 사진&#10;&#10;자동 생성된 설명">
-            <a:extLst>
-              <a:ext uri="{FF2B5EF4-FFF2-40B4-BE49-F238E27FC236}">
-                <a16:creationId xmlns:a16="http://schemas.microsoft.com/office/drawing/2014/main" id="{30493065-822D-4BAC-F6E2-FFC9E14F3E12}"/>
-              </a:ext>
-            </a:extLst>
-          </p:cNvPr>
-          <p:cNvPicPr>
-            <a:picLocks noChangeAspect="1"/>
-          </p:cNvPicPr>
-          <p:nvPr/>
-        </p:nvPicPr>
-        <p:blipFill>
-          <a:blip r:embed="rId2"/>
-          <a:stretch>
-            <a:fillRect/>
-          </a:stretch>
-        </p:blipFill>
-        <p:spPr>
-          <a:xfrm>
-            <a:off x="2167241" y="899594"/>
-            <a:ext cx="7451321" cy="4170670"/>
-          </a:xfrm>
-          <a:prstGeom prst="rect">
-            <a:avLst/>
-          </a:prstGeom>
-        </p:spPr>
-      </p:pic>
       <p:sp>
         <p:nvSpPr>
           <p:cNvPr id="2" name="슬라이드 번호 개체 틀 1">
@@ -6777,6 +6830,53 @@
           </a:p>
         </p:txBody>
       </p:sp>
+      <p:pic>
+        <p:nvPicPr>
+          <p:cNvPr id="8" name="Picture 5" descr="Observability with OpenTelemetry: Unveiling Insights into Your Applications  | by Rajesh Vinayagam | AWS Tip">
+            <a:extLst>
+              <a:ext uri="{FF2B5EF4-FFF2-40B4-BE49-F238E27FC236}">
+                <a16:creationId xmlns:a16="http://schemas.microsoft.com/office/drawing/2014/main" id="{C0BEA7E7-7A58-429F-4E36-3B6EBD740ACB}"/>
+              </a:ext>
+            </a:extLst>
+          </p:cNvPr>
+          <p:cNvPicPr>
+            <a:picLocks noChangeAspect="1" noChangeArrowheads="1"/>
+          </p:cNvPicPr>
+          <p:nvPr/>
+        </p:nvPicPr>
+        <p:blipFill>
+          <a:blip r:embed="rId2">
+            <a:extLst>
+              <a:ext uri="{28A0092B-C50C-407E-A947-70E740481C1C}">
+                <a14:useLocalDpi xmlns:a14="http://schemas.microsoft.com/office/drawing/2010/main" val="0"/>
+              </a:ext>
+            </a:extLst>
+          </a:blip>
+          <a:srcRect/>
+          <a:stretch>
+            <a:fillRect/>
+          </a:stretch>
+        </p:blipFill>
+        <p:spPr bwMode="auto">
+          <a:xfrm>
+            <a:off x="0" y="1060687"/>
+            <a:ext cx="12192000" cy="3640137"/>
+          </a:xfrm>
+          <a:prstGeom prst="rect">
+            <a:avLst/>
+          </a:prstGeom>
+          <a:noFill/>
+          <a:extLst>
+            <a:ext uri="{909E8E84-426E-40DD-AFC4-6F175D3DCCD1}">
+              <a14:hiddenFill xmlns:a14="http://schemas.microsoft.com/office/drawing/2010/main">
+                <a:solidFill>
+                  <a:srgbClr val="FFFFFF"/>
+                </a:solidFill>
+              </a14:hiddenFill>
+            </a:ext>
+          </a:extLst>
+        </p:spPr>
+      </p:pic>
     </p:spTree>
     <p:extLst>
       <p:ext uri="{BB962C8B-B14F-4D97-AF65-F5344CB8AC3E}">
@@ -7297,10 +7397,10 @@
       </p:sp>
       <p:pic>
         <p:nvPicPr>
-          <p:cNvPr id="9" name="Picture 2" descr="OpenTelemetry on Kubernetes. Deploying an OpenTelemetry Collector on… | by  Magsther | Medium">
-            <a:extLst>
-              <a:ext uri="{FF2B5EF4-FFF2-40B4-BE49-F238E27FC236}">
-                <a16:creationId xmlns:a16="http://schemas.microsoft.com/office/drawing/2014/main" id="{B5874751-0F29-E92F-02EA-67597A063B53}"/>
+          <p:cNvPr id="4" name="Picture 5" descr="Observability with OpenTelemetry: Unveiling Insights into Your Applications  | by Rajesh Vinayagam | AWS Tip">
+            <a:extLst>
+              <a:ext uri="{FF2B5EF4-FFF2-40B4-BE49-F238E27FC236}">
+                <a16:creationId xmlns:a16="http://schemas.microsoft.com/office/drawing/2014/main" id="{9AA744C5-2250-E84C-DA11-B57D47BB6A83}"/>
               </a:ext>
             </a:extLst>
           </p:cNvPr>
@@ -7324,8 +7424,8 @@
         </p:blipFill>
         <p:spPr bwMode="auto">
           <a:xfrm>
-            <a:off x="1202409" y="733425"/>
-            <a:ext cx="8977745" cy="3969847"/>
+            <a:off x="0" y="1060687"/>
+            <a:ext cx="12192000" cy="3640137"/>
           </a:xfrm>
           <a:prstGeom prst="rect">
             <a:avLst/>
@@ -8984,53 +9084,6 @@
           </a:p>
         </p:txBody>
       </p:sp>
-      <p:pic>
-        <p:nvPicPr>
-          <p:cNvPr id="8194" name="Picture 2" descr="Prometheus란?">
-            <a:extLst>
-              <a:ext uri="{FF2B5EF4-FFF2-40B4-BE49-F238E27FC236}">
-                <a16:creationId xmlns:a16="http://schemas.microsoft.com/office/drawing/2014/main" id="{92BB2754-B900-1BBD-A776-301F98BEF14D}"/>
-              </a:ext>
-            </a:extLst>
-          </p:cNvPr>
-          <p:cNvPicPr>
-            <a:picLocks noChangeAspect="1" noChangeArrowheads="1"/>
-          </p:cNvPicPr>
-          <p:nvPr/>
-        </p:nvPicPr>
-        <p:blipFill>
-          <a:blip r:embed="rId2">
-            <a:extLst>
-              <a:ext uri="{28A0092B-C50C-407E-A947-70E740481C1C}">
-                <a14:useLocalDpi xmlns:a14="http://schemas.microsoft.com/office/drawing/2010/main" val="0"/>
-              </a:ext>
-            </a:extLst>
-          </a:blip>
-          <a:srcRect/>
-          <a:stretch>
-            <a:fillRect/>
-          </a:stretch>
-        </p:blipFill>
-        <p:spPr bwMode="auto">
-          <a:xfrm>
-            <a:off x="3022452" y="900545"/>
-            <a:ext cx="5948791" cy="4242122"/>
-          </a:xfrm>
-          <a:prstGeom prst="rect">
-            <a:avLst/>
-          </a:prstGeom>
-          <a:noFill/>
-          <a:extLst>
-            <a:ext uri="{909E8E84-426E-40DD-AFC4-6F175D3DCCD1}">
-              <a14:hiddenFill xmlns:a14="http://schemas.microsoft.com/office/drawing/2010/main">
-                <a:solidFill>
-                  <a:srgbClr val="FFFFFF"/>
-                </a:solidFill>
-              </a14:hiddenFill>
-            </a:ext>
-          </a:extLst>
-        </p:spPr>
-      </p:pic>
       <p:sp>
         <p:nvSpPr>
           <p:cNvPr id="2" name="슬라이드 번호 개체 틀 1">
@@ -9060,6 +9113,36 @@
           </a:p>
         </p:txBody>
       </p:sp>
+      <p:pic>
+        <p:nvPicPr>
+          <p:cNvPr id="7" name="그림 6">
+            <a:extLst>
+              <a:ext uri="{FF2B5EF4-FFF2-40B4-BE49-F238E27FC236}">
+                <a16:creationId xmlns:a16="http://schemas.microsoft.com/office/drawing/2014/main" id="{7365BD71-DCE7-6707-CDCD-B91335BF79BA}"/>
+              </a:ext>
+            </a:extLst>
+          </p:cNvPr>
+          <p:cNvPicPr>
+            <a:picLocks noChangeAspect="1"/>
+          </p:cNvPicPr>
+          <p:nvPr/>
+        </p:nvPicPr>
+        <p:blipFill>
+          <a:blip r:embed="rId2"/>
+          <a:stretch>
+            <a:fillRect/>
+          </a:stretch>
+        </p:blipFill>
+        <p:spPr>
+          <a:xfrm>
+            <a:off x="1228780" y="973276"/>
+            <a:ext cx="9438870" cy="4193398"/>
+          </a:xfrm>
+          <a:prstGeom prst="rect">
+            <a:avLst/>
+          </a:prstGeom>
+        </p:spPr>
+      </p:pic>
     </p:spTree>
     <p:extLst>
       <p:ext uri="{BB962C8B-B14F-4D97-AF65-F5344CB8AC3E}">

</xml_diff>